<commit_message>
Add Figure source file to notes on Spark memory configuration
</commit_message>
<xml_diff>
--- a/Spark_Notes/SparkExecutorMemory.pptx
+++ b/Spark_Notes/SparkExecutorMemory.pptx
@@ -243,7 +243,7 @@
           <a:p>
             <a:fld id="{D6A4B39F-B1B7-4540-9CD5-34E08F14BC09}" type="datetimeFigureOut">
               <a:rPr lang="en-GB" smtClean="0"/>
-              <a:t>31/08/2020</a:t>
+              <a:t>09/09/2020</a:t>
             </a:fld>
             <a:endParaRPr lang="en-GB"/>
           </a:p>
@@ -413,7 +413,7 @@
           <a:p>
             <a:fld id="{D6A4B39F-B1B7-4540-9CD5-34E08F14BC09}" type="datetimeFigureOut">
               <a:rPr lang="en-GB" smtClean="0"/>
-              <a:t>31/08/2020</a:t>
+              <a:t>09/09/2020</a:t>
             </a:fld>
             <a:endParaRPr lang="en-GB"/>
           </a:p>
@@ -593,7 +593,7 @@
           <a:p>
             <a:fld id="{D6A4B39F-B1B7-4540-9CD5-34E08F14BC09}" type="datetimeFigureOut">
               <a:rPr lang="en-GB" smtClean="0"/>
-              <a:t>31/08/2020</a:t>
+              <a:t>09/09/2020</a:t>
             </a:fld>
             <a:endParaRPr lang="en-GB"/>
           </a:p>
@@ -763,7 +763,7 @@
           <a:p>
             <a:fld id="{D6A4B39F-B1B7-4540-9CD5-34E08F14BC09}" type="datetimeFigureOut">
               <a:rPr lang="en-GB" smtClean="0"/>
-              <a:t>31/08/2020</a:t>
+              <a:t>09/09/2020</a:t>
             </a:fld>
             <a:endParaRPr lang="en-GB"/>
           </a:p>
@@ -1009,7 +1009,7 @@
           <a:p>
             <a:fld id="{D6A4B39F-B1B7-4540-9CD5-34E08F14BC09}" type="datetimeFigureOut">
               <a:rPr lang="en-GB" smtClean="0"/>
-              <a:t>31/08/2020</a:t>
+              <a:t>09/09/2020</a:t>
             </a:fld>
             <a:endParaRPr lang="en-GB"/>
           </a:p>
@@ -1241,7 +1241,7 @@
           <a:p>
             <a:fld id="{D6A4B39F-B1B7-4540-9CD5-34E08F14BC09}" type="datetimeFigureOut">
               <a:rPr lang="en-GB" smtClean="0"/>
-              <a:t>31/08/2020</a:t>
+              <a:t>09/09/2020</a:t>
             </a:fld>
             <a:endParaRPr lang="en-GB"/>
           </a:p>
@@ -1608,7 +1608,7 @@
           <a:p>
             <a:fld id="{D6A4B39F-B1B7-4540-9CD5-34E08F14BC09}" type="datetimeFigureOut">
               <a:rPr lang="en-GB" smtClean="0"/>
-              <a:t>31/08/2020</a:t>
+              <a:t>09/09/2020</a:t>
             </a:fld>
             <a:endParaRPr lang="en-GB"/>
           </a:p>
@@ -1726,7 +1726,7 @@
           <a:p>
             <a:fld id="{D6A4B39F-B1B7-4540-9CD5-34E08F14BC09}" type="datetimeFigureOut">
               <a:rPr lang="en-GB" smtClean="0"/>
-              <a:t>31/08/2020</a:t>
+              <a:t>09/09/2020</a:t>
             </a:fld>
             <a:endParaRPr lang="en-GB"/>
           </a:p>
@@ -1821,7 +1821,7 @@
           <a:p>
             <a:fld id="{D6A4B39F-B1B7-4540-9CD5-34E08F14BC09}" type="datetimeFigureOut">
               <a:rPr lang="en-GB" smtClean="0"/>
-              <a:t>31/08/2020</a:t>
+              <a:t>09/09/2020</a:t>
             </a:fld>
             <a:endParaRPr lang="en-GB"/>
           </a:p>
@@ -2098,7 +2098,7 @@
           <a:p>
             <a:fld id="{D6A4B39F-B1B7-4540-9CD5-34E08F14BC09}" type="datetimeFigureOut">
               <a:rPr lang="en-GB" smtClean="0"/>
-              <a:t>31/08/2020</a:t>
+              <a:t>09/09/2020</a:t>
             </a:fld>
             <a:endParaRPr lang="en-GB"/>
           </a:p>
@@ -2351,7 +2351,7 @@
           <a:p>
             <a:fld id="{D6A4B39F-B1B7-4540-9CD5-34E08F14BC09}" type="datetimeFigureOut">
               <a:rPr lang="en-GB" smtClean="0"/>
-              <a:t>31/08/2020</a:t>
+              <a:t>09/09/2020</a:t>
             </a:fld>
             <a:endParaRPr lang="en-GB"/>
           </a:p>
@@ -2564,7 +2564,7 @@
           <a:p>
             <a:fld id="{D6A4B39F-B1B7-4540-9CD5-34E08F14BC09}" type="datetimeFigureOut">
               <a:rPr lang="en-GB" smtClean="0"/>
-              <a:t>31/08/2020</a:t>
+              <a:t>09/09/2020</a:t>
             </a:fld>
             <a:endParaRPr lang="en-GB"/>
           </a:p>
@@ -3957,8 +3957,8 @@
         </p:nvSpPr>
         <p:spPr>
           <a:xfrm>
-            <a:off x="6157650" y="6574916"/>
-            <a:ext cx="5766235" cy="292388"/>
+            <a:off x="5917151" y="6581661"/>
+            <a:ext cx="6082305" cy="292388"/>
           </a:xfrm>
           <a:prstGeom prst="rect">
             <a:avLst/>
@@ -3979,8 +3979,13 @@
             </a:r>
             <a:r>
               <a:rPr lang="en-US" sz="1300" noProof="1"/>
-              <a:t> - Aug 2020, CC BY-SA</a:t>
-            </a:r>
+              <a:t> - Aug 2020, CC </a:t>
+            </a:r>
+            <a:r>
+              <a:rPr lang="en-US" sz="1300" noProof="1" smtClean="0"/>
+              <a:t>BY-SA 2.0</a:t>
+            </a:r>
+            <a:endParaRPr lang="en-US" sz="1300" noProof="1"/>
           </a:p>
         </p:txBody>
       </p:sp>
@@ -4510,7 +4515,7 @@
         <p:spPr>
           <a:xfrm>
             <a:off x="2646639" y="5334070"/>
-            <a:ext cx="2020457" cy="778576"/>
+            <a:ext cx="2020457" cy="769104"/>
           </a:xfrm>
           <a:prstGeom prst="rect">
             <a:avLst/>

</xml_diff>